<commit_message>
add speakerrate url to slides
</commit_message>
<xml_diff>
--- a/presentation/iowa_code_camp_chef_2011.pptx
+++ b/presentation/iowa_code_camp_chef_2011.pptx
@@ -181,6 +181,11 @@
         </a:xfrm>
       </p:grpSpPr>
     </p:spTree>
+    <p:extLst>
+      <p:ext uri="{BB962C8B-B14F-4D97-AF65-F5344CB8AC3E}">
+        <p14:creationId xmlns:p14="http://schemas.microsoft.com/office/powerpoint/2010/main" val="1448327074"/>
+      </p:ext>
+    </p:extLst>
   </p:cSld>
   <p:clrMap bg1="lt1" tx1="dk1" bg2="lt2" tx2="dk2" accent1="accent1" accent2="accent2" accent3="accent3" accent4="accent4" accent5="accent5" accent6="accent6" hlink="hlink" folHlink="folHlink"/>
   <p:notesStyle>
@@ -1064,7 +1069,7 @@
   <p:timing>
     <p:tnLst>
       <p:par>
-        <p:cTn id="1" dur="indefinite" restart="never" nodeType="tmRoot"/>
+        <p:cTn xmlns:p14="http://schemas.microsoft.com/office/powerpoint/2010/main" id="1" dur="indefinite" restart="never" nodeType="tmRoot"/>
       </p:par>
     </p:tnLst>
   </p:timing>
@@ -1162,7 +1167,7 @@
   <p:timing>
     <p:tnLst>
       <p:par>
-        <p:cTn id="1" dur="indefinite" restart="never" nodeType="tmRoot"/>
+        <p:cTn xmlns:p14="http://schemas.microsoft.com/office/powerpoint/2010/main" id="1" dur="indefinite" restart="never" nodeType="tmRoot"/>
       </p:par>
     </p:tnLst>
   </p:timing>
@@ -1547,7 +1552,7 @@
   <p:timing>
     <p:tnLst>
       <p:par>
-        <p:cTn id="1" dur="indefinite" restart="never" nodeType="tmRoot"/>
+        <p:cTn xmlns:p14="http://schemas.microsoft.com/office/powerpoint/2010/main" id="1" dur="indefinite" restart="never" nodeType="tmRoot"/>
       </p:par>
     </p:tnLst>
   </p:timing>
@@ -1658,7 +1663,7 @@
   <p:timing>
     <p:tnLst>
       <p:par>
-        <p:cTn id="1" dur="indefinite" restart="never" nodeType="tmRoot"/>
+        <p:cTn xmlns:p14="http://schemas.microsoft.com/office/powerpoint/2010/main" id="1" dur="indefinite" restart="never" nodeType="tmRoot"/>
       </p:par>
     </p:tnLst>
   </p:timing>
@@ -1900,7 +1905,7 @@
   <p:timing>
     <p:tnLst>
       <p:par>
-        <p:cTn id="1" dur="indefinite" restart="never" nodeType="tmRoot"/>
+        <p:cTn xmlns:p14="http://schemas.microsoft.com/office/powerpoint/2010/main" id="1" dur="indefinite" restart="never" nodeType="tmRoot"/>
       </p:par>
     </p:tnLst>
   </p:timing>
@@ -2010,7 +2015,7 @@
   <p:timing>
     <p:tnLst>
       <p:par>
-        <p:cTn id="1" dur="indefinite" restart="never" nodeType="tmRoot"/>
+        <p:cTn xmlns:p14="http://schemas.microsoft.com/office/powerpoint/2010/main" id="1" dur="indefinite" restart="never" nodeType="tmRoot"/>
       </p:par>
     </p:tnLst>
   </p:timing>
@@ -2108,7 +2113,7 @@
   <p:timing>
     <p:tnLst>
       <p:par>
-        <p:cTn id="1" dur="indefinite" restart="never" nodeType="tmRoot"/>
+        <p:cTn xmlns:p14="http://schemas.microsoft.com/office/powerpoint/2010/main" id="1" dur="indefinite" restart="never" nodeType="tmRoot"/>
       </p:par>
     </p:tnLst>
   </p:timing>
@@ -2318,7 +2323,7 @@
   <p:timing>
     <p:tnLst>
       <p:par>
-        <p:cTn id="1" dur="indefinite" restart="never" nodeType="tmRoot"/>
+        <p:cTn xmlns:p14="http://schemas.microsoft.com/office/powerpoint/2010/main" id="1" dur="indefinite" restart="never" nodeType="tmRoot"/>
       </p:par>
     </p:tnLst>
   </p:timing>
@@ -2514,7 +2519,7 @@
   <p:timing>
     <p:tnLst>
       <p:par>
-        <p:cTn id="1" dur="indefinite" restart="never" nodeType="tmRoot"/>
+        <p:cTn xmlns:p14="http://schemas.microsoft.com/office/powerpoint/2010/main" id="1" dur="indefinite" restart="never" nodeType="tmRoot"/>
       </p:par>
     </p:tnLst>
   </p:timing>
@@ -2610,7 +2615,7 @@
   <p:timing>
     <p:tnLst>
       <p:par>
-        <p:cTn id="1" dur="indefinite" restart="never" nodeType="tmRoot"/>
+        <p:cTn xmlns:p14="http://schemas.microsoft.com/office/powerpoint/2010/main" id="1" dur="indefinite" restart="never" nodeType="tmRoot"/>
       </p:par>
     </p:tnLst>
   </p:timing>
@@ -2665,7 +2670,7 @@
           <a:p>
             <a:pPr eaLnBrk="1" hangingPunct="1"/>
             <a:r>
-              <a:rPr lang="en-US" smtClean="0">
+              <a:rPr lang="en-US" dirty="0" smtClean="0">
                 <a:latin typeface="Gill Sans MT" pitchFamily="34" charset="0"/>
               </a:rPr>
               <a:t>Thank You</a:t>
@@ -2685,7 +2690,7 @@
         </p:nvSpPr>
         <p:spPr bwMode="auto">
           <a:xfrm>
-            <a:off x="762000" y="3771900"/>
+            <a:off x="838200" y="2476500"/>
             <a:ext cx="5905500" cy="1428750"/>
           </a:xfrm>
           <a:prstGeom prst="rect">
@@ -2704,11 +2709,59 @@
           <a:p>
             <a:pPr algn="ctr" eaLnBrk="1" hangingPunct="1"/>
             <a:r>
-              <a:rPr lang="en-US" sz="2400" smtClean="0">
-                <a:latin typeface="Gill Sans MT" pitchFamily="34" charset="0"/>
-              </a:rPr>
-              <a:t>Questions?</a:t>
-            </a:r>
+              <a:rPr lang="en-US" sz="2400" dirty="0" smtClean="0">
+                <a:latin typeface="Gill Sans MT" pitchFamily="34" charset="0"/>
+              </a:rPr>
+              <a:t>Questions</a:t>
+            </a:r>
+            <a:r>
+              <a:rPr lang="en-US" sz="2400" dirty="0" smtClean="0">
+                <a:latin typeface="Gill Sans MT" pitchFamily="34" charset="0"/>
+              </a:rPr>
+              <a:t>?</a:t>
+            </a:r>
+          </a:p>
+          <a:p>
+            <a:pPr algn="ctr" eaLnBrk="1" hangingPunct="1"/>
+            <a:endParaRPr lang="en-US" sz="2400" dirty="0">
+              <a:latin typeface="Gill Sans MT" pitchFamily="34" charset="0"/>
+            </a:endParaRPr>
+          </a:p>
+          <a:p>
+            <a:pPr algn="ctr" eaLnBrk="1" hangingPunct="1"/>
+            <a:endParaRPr lang="en-US" sz="2400" dirty="0" smtClean="0">
+              <a:latin typeface="Gill Sans MT" pitchFamily="34" charset="0"/>
+            </a:endParaRPr>
+          </a:p>
+          <a:p>
+            <a:pPr algn="ctr" eaLnBrk="1" hangingPunct="1"/>
+            <a:endParaRPr lang="en-US" sz="2400" dirty="0" smtClean="0">
+              <a:latin typeface="Gill Sans MT" pitchFamily="34" charset="0"/>
+            </a:endParaRPr>
+          </a:p>
+          <a:p>
+            <a:pPr algn="ctr" eaLnBrk="1" hangingPunct="1"/>
+            <a:endParaRPr lang="en-US" sz="2400" dirty="0">
+              <a:latin typeface="Gill Sans MT" pitchFamily="34" charset="0"/>
+            </a:endParaRPr>
+          </a:p>
+          <a:p>
+            <a:pPr algn="ctr" eaLnBrk="1" hangingPunct="1"/>
+            <a:r>
+              <a:rPr lang="en-US" sz="2400" dirty="0" smtClean="0">
+                <a:latin typeface="Gill Sans MT" pitchFamily="34" charset="0"/>
+              </a:rPr>
+              <a:t>Rate </a:t>
+            </a:r>
+            <a:r>
+              <a:rPr lang="en-US" sz="2400" dirty="0">
+                <a:latin typeface="Gill Sans MT" pitchFamily="34" charset="0"/>
+              </a:rPr>
+              <a:t>this: http://spkr8.com/t/7359</a:t>
+            </a:r>
+            <a:endParaRPr lang="en-US" sz="2400" dirty="0" smtClean="0">
+              <a:latin typeface="Gill Sans MT" pitchFamily="34" charset="0"/>
+            </a:endParaRPr>
           </a:p>
         </p:txBody>
       </p:sp>
@@ -2720,7 +2773,7 @@
   <p:timing>
     <p:tnLst>
       <p:par>
-        <p:cTn id="1" dur="indefinite" restart="never" nodeType="tmRoot"/>
+        <p:cTn xmlns:p14="http://schemas.microsoft.com/office/powerpoint/2010/main" id="1" dur="indefinite" restart="never" nodeType="tmRoot"/>
       </p:par>
     </p:tnLst>
   </p:timing>
@@ -2958,7 +3011,7 @@
   <p:timing>
     <p:tnLst>
       <p:par>
-        <p:cTn id="1" dur="indefinite" restart="never" nodeType="tmRoot"/>
+        <p:cTn xmlns:p14="http://schemas.microsoft.com/office/powerpoint/2010/main" id="1" dur="indefinite" restart="never" nodeType="tmRoot"/>
       </p:par>
     </p:tnLst>
   </p:timing>
@@ -3093,7 +3146,7 @@
   <p:timing>
     <p:tnLst>
       <p:par>
-        <p:cTn id="1" dur="indefinite" restart="never" nodeType="tmRoot"/>
+        <p:cTn xmlns:p14="http://schemas.microsoft.com/office/powerpoint/2010/main" id="1" dur="indefinite" restart="never" nodeType="tmRoot"/>
       </p:par>
     </p:tnLst>
   </p:timing>
@@ -3282,7 +3335,7 @@
   <p:timing>
     <p:tnLst>
       <p:par>
-        <p:cTn id="1" dur="indefinite" restart="never" nodeType="tmRoot"/>
+        <p:cTn xmlns:p14="http://schemas.microsoft.com/office/powerpoint/2010/main" id="1" dur="indefinite" restart="never" nodeType="tmRoot"/>
       </p:par>
     </p:tnLst>
   </p:timing>
@@ -3465,7 +3518,7 @@
   <p:timing>
     <p:tnLst>
       <p:par>
-        <p:cTn id="1" dur="indefinite" restart="never" nodeType="tmRoot"/>
+        <p:cTn xmlns:p14="http://schemas.microsoft.com/office/powerpoint/2010/main" id="1" dur="indefinite" restart="never" nodeType="tmRoot"/>
       </p:par>
     </p:tnLst>
   </p:timing>
@@ -3607,7 +3660,7 @@
   <p:timing>
     <p:tnLst>
       <p:par>
-        <p:cTn id="1" dur="indefinite" restart="never" nodeType="tmRoot"/>
+        <p:cTn xmlns:p14="http://schemas.microsoft.com/office/powerpoint/2010/main" id="1" dur="indefinite" restart="never" nodeType="tmRoot"/>
       </p:par>
     </p:tnLst>
   </p:timing>
@@ -3801,7 +3854,7 @@
   <p:timing>
     <p:tnLst>
       <p:par>
-        <p:cTn id="1" dur="indefinite" restart="never" nodeType="tmRoot"/>
+        <p:cTn xmlns:p14="http://schemas.microsoft.com/office/powerpoint/2010/main" id="1" dur="indefinite" restart="never" nodeType="tmRoot"/>
       </p:par>
     </p:tnLst>
   </p:timing>
@@ -4527,7 +4580,7 @@
   <p:timing>
     <p:tnLst>
       <p:par>
-        <p:cTn id="1" dur="indefinite" restart="never" nodeType="tmRoot"/>
+        <p:cTn xmlns:p14="http://schemas.microsoft.com/office/powerpoint/2010/main" id="1" dur="indefinite" restart="never" nodeType="tmRoot"/>
       </p:par>
     </p:tnLst>
   </p:timing>
@@ -4665,7 +4718,7 @@
   <p:timing>
     <p:tnLst>
       <p:par>
-        <p:cTn id="1" dur="indefinite" restart="never" nodeType="tmRoot"/>
+        <p:cTn xmlns:p14="http://schemas.microsoft.com/office/powerpoint/2010/main" id="1" dur="indefinite" restart="never" nodeType="tmRoot"/>
       </p:par>
     </p:tnLst>
   </p:timing>

</xml_diff>